<commit_message>
more stuff added to the arrays topic
</commit_message>
<xml_diff>
--- a/JS Fundamentals/5.Arrays/JS-Arrays.pptx
+++ b/JS Fundamentals/5.Arrays/JS-Arrays.pptx
@@ -5,7 +5,7 @@
     <p:sldMasterId id="2147484157" r:id="rId1"/>
   </p:sldMasterIdLst>
   <p:notesMasterIdLst>
-    <p:notesMasterId r:id="rId20"/>
+    <p:notesMasterId r:id="rId22"/>
   </p:notesMasterIdLst>
   <p:sldIdLst>
     <p:sldId id="256" r:id="rId2"/>
@@ -24,8 +24,10 @@
     <p:sldId id="290" r:id="rId15"/>
     <p:sldId id="291" r:id="rId16"/>
     <p:sldId id="292" r:id="rId17"/>
-    <p:sldId id="266" r:id="rId18"/>
-    <p:sldId id="278" r:id="rId19"/>
+    <p:sldId id="293" r:id="rId18"/>
+    <p:sldId id="294" r:id="rId19"/>
+    <p:sldId id="266" r:id="rId20"/>
+    <p:sldId id="278" r:id="rId21"/>
   </p:sldIdLst>
   <p:sldSz cx="12192000" cy="6858000"/>
   <p:notesSz cx="6858000" cy="9144000"/>
@@ -6708,15 +6710,7 @@
           <a:p>
             <a:r>
               <a:rPr lang="bg-BG" dirty="0" smtClean="0"/>
-              <a:t>Масиви</a:t>
-            </a:r>
-            <a:r>
-              <a:rPr lang="bg-BG" dirty="0" smtClean="0"/>
-              <a:t> </a:t>
-            </a:r>
-            <a:r>
-              <a:rPr lang="bg-BG" dirty="0" smtClean="0"/>
-              <a:t>в </a:t>
+              <a:t>Масиви в </a:t>
             </a:r>
             <a:r>
               <a:rPr lang="en-US" dirty="0" smtClean="0"/>
@@ -8103,6 +8097,202 @@
           <a:chExt cx="0" cy="0"/>
         </a:xfrm>
       </p:grpSpPr>
+      <p:sp>
+        <p:nvSpPr>
+          <p:cNvPr id="2" name="Title 1"/>
+          <p:cNvSpPr>
+            <a:spLocks noGrp="1"/>
+          </p:cNvSpPr>
+          <p:nvPr>
+            <p:ph type="title"/>
+          </p:nvPr>
+        </p:nvSpPr>
+        <p:spPr/>
+        <p:txBody>
+          <a:bodyPr/>
+          <a:lstStyle/>
+          <a:p>
+            <a:r>
+              <a:rPr lang="bg-BG" dirty="0" smtClean="0"/>
+              <a:t>Асоциативен масив</a:t>
+            </a:r>
+            <a:endParaRPr lang="en-US" dirty="0"/>
+          </a:p>
+        </p:txBody>
+      </p:sp>
+      <p:sp>
+        <p:nvSpPr>
+          <p:cNvPr id="3" name="Content Placeholder 2"/>
+          <p:cNvSpPr>
+            <a:spLocks noGrp="1"/>
+          </p:cNvSpPr>
+          <p:nvPr>
+            <p:ph idx="1"/>
+          </p:nvPr>
+        </p:nvSpPr>
+        <p:spPr/>
+        <p:txBody>
+          <a:bodyPr/>
+          <a:lstStyle/>
+          <a:p>
+            <a:r>
+              <a:rPr lang="bg-BG" dirty="0" smtClean="0"/>
+              <a:t>Асоциативният масив е масив с именувани индекси, т.е индексите не са поредни числа, ами зададени от потребителя имена</a:t>
+            </a:r>
+          </a:p>
+          <a:p>
+            <a:r>
+              <a:rPr lang="bg-BG" dirty="0" smtClean="0"/>
+              <a:t>В действителност асоциативния масив не е от тип масив, ами е от тип обект</a:t>
+            </a:r>
+          </a:p>
+          <a:p>
+            <a:pPr lvl="1"/>
+            <a:r>
+              <a:rPr lang="bg-BG" dirty="0" smtClean="0"/>
+              <a:t>Повечето от предефинираните методи за масиви не работят върху него</a:t>
+            </a:r>
+          </a:p>
+          <a:p>
+            <a:r>
+              <a:rPr lang="bg-BG" dirty="0" smtClean="0"/>
+              <a:t>Обхожда се чрез </a:t>
+            </a:r>
+            <a:r>
+              <a:rPr lang="en-US" dirty="0" smtClean="0"/>
+              <a:t>for-in</a:t>
+            </a:r>
+            <a:r>
+              <a:rPr lang="bg-BG" dirty="0" smtClean="0"/>
+              <a:t> цикъл</a:t>
+            </a:r>
+          </a:p>
+          <a:p>
+            <a:pPr marL="0" indent="0">
+              <a:buNone/>
+            </a:pPr>
+            <a:endParaRPr lang="en-US" dirty="0"/>
+          </a:p>
+        </p:txBody>
+      </p:sp>
+    </p:spTree>
+    <p:extLst>
+      <p:ext uri="{BB962C8B-B14F-4D97-AF65-F5344CB8AC3E}">
+        <p14:creationId xmlns:p14="http://schemas.microsoft.com/office/powerpoint/2010/main" val="3726855540"/>
+      </p:ext>
+    </p:extLst>
+  </p:cSld>
+  <p:clrMapOvr>
+    <a:masterClrMapping/>
+  </p:clrMapOvr>
+</p:sld>
+</file>
+
+<file path=ppt/slides/slide18.xml><?xml version="1.0" encoding="utf-8"?>
+<p:sld xmlns:a="http://schemas.openxmlformats.org/drawingml/2006/main" xmlns:r="http://schemas.openxmlformats.org/officeDocument/2006/relationships" xmlns:p="http://schemas.openxmlformats.org/presentationml/2006/main">
+  <p:cSld>
+    <p:spTree>
+      <p:nvGrpSpPr>
+        <p:cNvPr id="1" name=""/>
+        <p:cNvGrpSpPr/>
+        <p:nvPr/>
+      </p:nvGrpSpPr>
+      <p:grpSpPr>
+        <a:xfrm>
+          <a:off x="0" y="0"/>
+          <a:ext cx="0" cy="0"/>
+          <a:chOff x="0" y="0"/>
+          <a:chExt cx="0" cy="0"/>
+        </a:xfrm>
+      </p:grpSpPr>
+      <p:sp>
+        <p:nvSpPr>
+          <p:cNvPr id="6" name="Title 5"/>
+          <p:cNvSpPr>
+            <a:spLocks noGrp="1"/>
+          </p:cNvSpPr>
+          <p:nvPr>
+            <p:ph type="title"/>
+          </p:nvPr>
+        </p:nvSpPr>
+        <p:spPr>
+          <a:xfrm>
+            <a:off x="1484311" y="166256"/>
+            <a:ext cx="10018713" cy="2272144"/>
+          </a:xfrm>
+        </p:spPr>
+        <p:txBody>
+          <a:bodyPr/>
+          <a:lstStyle/>
+          <a:p>
+            <a:r>
+              <a:rPr lang="bg-BG" dirty="0" smtClean="0"/>
+              <a:t>Асоциативни масиви</a:t>
+            </a:r>
+            <a:endParaRPr lang="en-US" dirty="0"/>
+          </a:p>
+        </p:txBody>
+      </p:sp>
+      <p:pic>
+        <p:nvPicPr>
+          <p:cNvPr id="7" name="Picture 6"/>
+          <p:cNvPicPr>
+            <a:picLocks noChangeAspect="1"/>
+          </p:cNvPicPr>
+          <p:nvPr/>
+        </p:nvPicPr>
+        <p:blipFill>
+          <a:blip r:embed="rId2">
+            <a:extLst>
+              <a:ext uri="{28A0092B-C50C-407E-A947-70E740481C1C}">
+                <a14:useLocalDpi xmlns:a14="http://schemas.microsoft.com/office/drawing/2010/main" val="0"/>
+              </a:ext>
+            </a:extLst>
+          </a:blip>
+          <a:stretch>
+            <a:fillRect/>
+          </a:stretch>
+        </p:blipFill>
+        <p:spPr>
+          <a:xfrm>
+            <a:off x="4112417" y="1943677"/>
+            <a:ext cx="4762500" cy="4762500"/>
+          </a:xfrm>
+          <a:prstGeom prst="rect">
+            <a:avLst/>
+          </a:prstGeom>
+        </p:spPr>
+      </p:pic>
+    </p:spTree>
+    <p:extLst>
+      <p:ext uri="{BB962C8B-B14F-4D97-AF65-F5344CB8AC3E}">
+        <p14:creationId xmlns:p14="http://schemas.microsoft.com/office/powerpoint/2010/main" val="4150244128"/>
+      </p:ext>
+    </p:extLst>
+  </p:cSld>
+  <p:clrMapOvr>
+    <a:masterClrMapping/>
+  </p:clrMapOvr>
+</p:sld>
+</file>
+
+<file path=ppt/slides/slide19.xml><?xml version="1.0" encoding="utf-8"?>
+<p:sld xmlns:a="http://schemas.openxmlformats.org/drawingml/2006/main" xmlns:r="http://schemas.openxmlformats.org/officeDocument/2006/relationships" xmlns:p="http://schemas.openxmlformats.org/presentationml/2006/main">
+  <p:cSld>
+    <p:spTree>
+      <p:nvGrpSpPr>
+        <p:cNvPr id="1" name=""/>
+        <p:cNvGrpSpPr/>
+        <p:nvPr/>
+      </p:nvGrpSpPr>
+      <p:grpSpPr>
+        <a:xfrm>
+          <a:off x="0" y="0"/>
+          <a:ext cx="0" cy="0"/>
+          <a:chOff x="0" y="0"/>
+          <a:chExt cx="0" cy="0"/>
+        </a:xfrm>
+      </p:grpSpPr>
       <p:pic>
         <p:nvPicPr>
           <p:cNvPr id="4" name="Content Placeholder 3"/>
@@ -8152,346 +8342,6 @@
 </p:sld>
 </file>
 
-<file path=ppt/slides/slide18.xml><?xml version="1.0" encoding="utf-8"?>
-<p:sld xmlns:a="http://schemas.openxmlformats.org/drawingml/2006/main" xmlns:r="http://schemas.openxmlformats.org/officeDocument/2006/relationships" xmlns:p="http://schemas.openxmlformats.org/presentationml/2006/main">
-  <p:cSld>
-    <p:spTree>
-      <p:nvGrpSpPr>
-        <p:cNvPr id="1" name=""/>
-        <p:cNvGrpSpPr/>
-        <p:nvPr/>
-      </p:nvGrpSpPr>
-      <p:grpSpPr>
-        <a:xfrm>
-          <a:off x="0" y="0"/>
-          <a:ext cx="0" cy="0"/>
-          <a:chOff x="0" y="0"/>
-          <a:chExt cx="0" cy="0"/>
-        </a:xfrm>
-      </p:grpSpPr>
-      <p:sp>
-        <p:nvSpPr>
-          <p:cNvPr id="2" name="Title 1"/>
-          <p:cNvSpPr>
-            <a:spLocks noGrp="1"/>
-          </p:cNvSpPr>
-          <p:nvPr>
-            <p:ph type="title"/>
-          </p:nvPr>
-        </p:nvSpPr>
-        <p:spPr/>
-        <p:txBody>
-          <a:bodyPr/>
-          <a:lstStyle/>
-          <a:p>
-            <a:r>
-              <a:rPr lang="bg-BG" dirty="0" smtClean="0"/>
-              <a:t>Домашна работа</a:t>
-            </a:r>
-            <a:endParaRPr lang="en-US" dirty="0"/>
-          </a:p>
-        </p:txBody>
-      </p:sp>
-      <p:sp>
-        <p:nvSpPr>
-          <p:cNvPr id="3" name="Content Placeholder 2"/>
-          <p:cNvSpPr>
-            <a:spLocks noGrp="1"/>
-          </p:cNvSpPr>
-          <p:nvPr>
-            <p:ph idx="1"/>
-          </p:nvPr>
-        </p:nvSpPr>
-        <p:spPr>
-          <a:xfrm>
-            <a:off x="1484310" y="2262909"/>
-            <a:ext cx="10199690" cy="3999347"/>
-          </a:xfrm>
-        </p:spPr>
-        <p:txBody>
-          <a:bodyPr anchor="ctr" anchorCtr="0">
-            <a:normAutofit fontScale="85000" lnSpcReduction="10000"/>
-          </a:bodyPr>
-          <a:lstStyle/>
-          <a:p>
-            <a:pPr marL="457200" indent="-457200">
-              <a:buFont typeface="+mj-lt"/>
-              <a:buAutoNum type="arabicPeriod"/>
-            </a:pPr>
-            <a:r>
-              <a:rPr lang="bg-BG" dirty="0" smtClean="0"/>
-              <a:t>Напишете </a:t>
-            </a:r>
-            <a:r>
-              <a:rPr lang="en-US" dirty="0" smtClean="0"/>
-              <a:t>JS</a:t>
-            </a:r>
-            <a:r>
-              <a:rPr lang="bg-BG" dirty="0"/>
-              <a:t> </a:t>
-            </a:r>
-            <a:r>
-              <a:rPr lang="bg-BG" dirty="0" smtClean="0"/>
-              <a:t>код, който </a:t>
-            </a:r>
-            <a:r>
-              <a:rPr lang="bg-BG" dirty="0" smtClean="0"/>
-              <a:t>създава масив от 20 числа и го инициализира като всяко число има стойност съответния индекс, умножен по 3</a:t>
-            </a:r>
-          </a:p>
-          <a:p>
-            <a:pPr marL="457200" indent="-457200">
-              <a:buFont typeface="+mj-lt"/>
-              <a:buAutoNum type="arabicPeriod"/>
-            </a:pPr>
-            <a:r>
-              <a:rPr lang="bg-BG" dirty="0" smtClean="0"/>
-              <a:t>Напишете </a:t>
-            </a:r>
-            <a:r>
-              <a:rPr lang="en-US" dirty="0" smtClean="0"/>
-              <a:t>JS</a:t>
-            </a:r>
-            <a:r>
-              <a:rPr lang="bg-BG" dirty="0"/>
-              <a:t> </a:t>
-            </a:r>
-            <a:r>
-              <a:rPr lang="bg-BG" dirty="0" smtClean="0"/>
-              <a:t>код, който по зададен масив да намира най-дългата поредица от еднакви числа. Напр</a:t>
-            </a:r>
-            <a:r>
-              <a:rPr lang="bg-BG" dirty="0"/>
-              <a:t>. 2, 1, 1, 2, 3, 3, </a:t>
-            </a:r>
-            <a:r>
-              <a:rPr lang="bg-BG" b="1" dirty="0"/>
-              <a:t>2, 2, 2</a:t>
-            </a:r>
-            <a:r>
-              <a:rPr lang="bg-BG" dirty="0"/>
-              <a:t>, </a:t>
-            </a:r>
-            <a:r>
-              <a:rPr lang="bg-BG" dirty="0" smtClean="0"/>
-              <a:t>1  -&gt; 2</a:t>
-            </a:r>
-            <a:r>
-              <a:rPr lang="bg-BG" dirty="0"/>
-              <a:t>, 2, </a:t>
-            </a:r>
-            <a:r>
-              <a:rPr lang="bg-BG" dirty="0" smtClean="0"/>
-              <a:t>2</a:t>
-            </a:r>
-          </a:p>
-          <a:p>
-            <a:pPr marL="457200" indent="-457200">
-              <a:buFont typeface="+mj-lt"/>
-              <a:buAutoNum type="arabicPeriod"/>
-            </a:pPr>
-            <a:r>
-              <a:rPr lang="bg-BG" dirty="0" smtClean="0"/>
-              <a:t>Напишете </a:t>
-            </a:r>
-            <a:r>
-              <a:rPr lang="en-US" dirty="0" smtClean="0"/>
-              <a:t>JS</a:t>
-            </a:r>
-            <a:r>
-              <a:rPr lang="bg-BG" dirty="0" smtClean="0"/>
-              <a:t> код, който намира кое е най-често срещаното число в даден масив. </a:t>
-            </a:r>
-            <a:r>
-              <a:rPr lang="bg-BG" dirty="0"/>
-              <a:t>Напр. 4, 1, 1, </a:t>
-            </a:r>
-            <a:r>
-              <a:rPr lang="bg-BG" b="1" dirty="0"/>
-              <a:t>4</a:t>
-            </a:r>
-            <a:r>
-              <a:rPr lang="bg-BG" dirty="0"/>
-              <a:t>, 2, 3, </a:t>
-            </a:r>
-            <a:r>
-              <a:rPr lang="bg-BG" b="1" dirty="0"/>
-              <a:t>4</a:t>
-            </a:r>
-            <a:r>
-              <a:rPr lang="bg-BG" dirty="0"/>
-              <a:t>, </a:t>
-            </a:r>
-            <a:r>
-              <a:rPr lang="bg-BG" b="1" dirty="0"/>
-              <a:t>4</a:t>
-            </a:r>
-            <a:r>
-              <a:rPr lang="bg-BG" dirty="0"/>
-              <a:t>, 1, 2, </a:t>
-            </a:r>
-            <a:r>
-              <a:rPr lang="bg-BG" b="1" dirty="0"/>
-              <a:t>4</a:t>
-            </a:r>
-            <a:r>
-              <a:rPr lang="bg-BG" dirty="0"/>
-              <a:t>, 9, </a:t>
-            </a:r>
-            <a:r>
-              <a:rPr lang="bg-BG" dirty="0" smtClean="0"/>
-              <a:t>3 -&gt; </a:t>
-            </a:r>
-            <a:r>
-              <a:rPr lang="bg-BG" b="1" dirty="0" smtClean="0"/>
-              <a:t>4</a:t>
-            </a:r>
-            <a:endParaRPr lang="bg-BG" b="1" dirty="0"/>
-          </a:p>
-          <a:p>
-            <a:pPr marL="457200" indent="-457200">
-              <a:buFont typeface="+mj-lt"/>
-              <a:buAutoNum type="arabicPeriod"/>
-            </a:pPr>
-            <a:r>
-              <a:rPr lang="bg-BG" dirty="0" smtClean="0"/>
-              <a:t>Напишете </a:t>
-            </a:r>
-            <a:r>
-              <a:rPr lang="en-US" dirty="0" smtClean="0"/>
-              <a:t>JS</a:t>
-            </a:r>
-            <a:r>
-              <a:rPr lang="bg-BG" dirty="0" smtClean="0"/>
-              <a:t> код, който да сортира даден масив. *Има и хитър начин на решение... Помислете и потърсете </a:t>
-            </a:r>
-            <a:r>
-              <a:rPr lang="bg-BG" dirty="0" smtClean="0">
-                <a:sym typeface="Wingdings" panose="05000000000000000000" pitchFamily="2" charset="2"/>
-              </a:rPr>
-              <a:t></a:t>
-            </a:r>
-          </a:p>
-          <a:p>
-            <a:pPr marL="457200" indent="-457200">
-              <a:buFont typeface="+mj-lt"/>
-              <a:buAutoNum type="arabicPeriod"/>
-            </a:pPr>
-            <a:r>
-              <a:rPr lang="bg-BG" dirty="0" smtClean="0">
-                <a:sym typeface="Wingdings" panose="05000000000000000000" pitchFamily="2" charset="2"/>
-              </a:rPr>
-              <a:t>Напишете </a:t>
-            </a:r>
-            <a:r>
-              <a:rPr lang="en-US" dirty="0" smtClean="0">
-                <a:sym typeface="Wingdings" panose="05000000000000000000" pitchFamily="2" charset="2"/>
-              </a:rPr>
-              <a:t>JS </a:t>
-            </a:r>
-            <a:r>
-              <a:rPr lang="bg-BG" dirty="0" smtClean="0">
-                <a:sym typeface="Wingdings" panose="05000000000000000000" pitchFamily="2" charset="2"/>
-              </a:rPr>
-              <a:t>код, който да сортира масив по „</a:t>
-            </a:r>
-            <a:r>
-              <a:rPr lang="bg-BG" dirty="0" smtClean="0">
-                <a:sym typeface="Wingdings" panose="05000000000000000000" pitchFamily="2" charset="2"/>
-                <a:hlinkClick r:id="rId2"/>
-              </a:rPr>
-              <a:t>метода на мехурчето</a:t>
-            </a:r>
-            <a:r>
-              <a:rPr lang="bg-BG" dirty="0" smtClean="0">
-                <a:sym typeface="Wingdings" panose="05000000000000000000" pitchFamily="2" charset="2"/>
-              </a:rPr>
-              <a:t>“</a:t>
-            </a:r>
-            <a:r>
-              <a:rPr lang="en-US" dirty="0" smtClean="0">
-                <a:sym typeface="Wingdings" panose="05000000000000000000" pitchFamily="2" charset="2"/>
-              </a:rPr>
-              <a:t> (bubble sort)</a:t>
-            </a:r>
-            <a:r>
-              <a:rPr lang="bg-BG" dirty="0" smtClean="0">
-                <a:sym typeface="Wingdings" panose="05000000000000000000" pitchFamily="2" charset="2"/>
-              </a:rPr>
-              <a:t>.</a:t>
-            </a:r>
-          </a:p>
-          <a:p>
-            <a:pPr marL="457200" indent="-457200">
-              <a:buFont typeface="+mj-lt"/>
-              <a:buAutoNum type="arabicPeriod"/>
-            </a:pPr>
-            <a:r>
-              <a:rPr lang="bg-BG" dirty="0" smtClean="0">
-                <a:sym typeface="Wingdings" panose="05000000000000000000" pitchFamily="2" charset="2"/>
-              </a:rPr>
-              <a:t>Напишете </a:t>
-            </a:r>
-            <a:r>
-              <a:rPr lang="en-US" dirty="0" smtClean="0">
-                <a:sym typeface="Wingdings" panose="05000000000000000000" pitchFamily="2" charset="2"/>
-              </a:rPr>
-              <a:t>JS</a:t>
-            </a:r>
-            <a:r>
-              <a:rPr lang="bg-BG" dirty="0" smtClean="0">
-                <a:sym typeface="Wingdings" panose="05000000000000000000" pitchFamily="2" charset="2"/>
-              </a:rPr>
-              <a:t> код</a:t>
-            </a:r>
-            <a:r>
-              <a:rPr lang="en-US" dirty="0" smtClean="0">
-                <a:sym typeface="Wingdings" panose="05000000000000000000" pitchFamily="2" charset="2"/>
-              </a:rPr>
-              <a:t>, </a:t>
-            </a:r>
-            <a:r>
-              <a:rPr lang="bg-BG" dirty="0" smtClean="0">
-                <a:sym typeface="Wingdings" panose="05000000000000000000" pitchFamily="2" charset="2"/>
-              </a:rPr>
-              <a:t>който намира индекса на даден елемент в сортиран масив като се използва </a:t>
-            </a:r>
-            <a:r>
-              <a:rPr lang="bg-BG" dirty="0" smtClean="0">
-                <a:sym typeface="Wingdings" panose="05000000000000000000" pitchFamily="2" charset="2"/>
-                <a:hlinkClick r:id="rId3"/>
-              </a:rPr>
-              <a:t>двоично търсене </a:t>
-            </a:r>
-            <a:r>
-              <a:rPr lang="bg-BG" dirty="0" smtClean="0">
-                <a:sym typeface="Wingdings" panose="05000000000000000000" pitchFamily="2" charset="2"/>
-              </a:rPr>
-              <a:t>(</a:t>
-            </a:r>
-            <a:r>
-              <a:rPr lang="en-US" dirty="0" smtClean="0">
-                <a:sym typeface="Wingdings" panose="05000000000000000000" pitchFamily="2" charset="2"/>
-              </a:rPr>
-              <a:t>binary search)</a:t>
-            </a:r>
-            <a:endParaRPr lang="bg-BG" dirty="0" smtClean="0"/>
-          </a:p>
-        </p:txBody>
-      </p:sp>
-    </p:spTree>
-    <p:extLst>
-      <p:ext uri="{BB962C8B-B14F-4D97-AF65-F5344CB8AC3E}">
-        <p14:creationId xmlns:p14="http://schemas.microsoft.com/office/powerpoint/2010/main" val="2161688977"/>
-      </p:ext>
-    </p:extLst>
-  </p:cSld>
-  <p:clrMapOvr>
-    <a:masterClrMapping/>
-  </p:clrMapOvr>
-</p:sld>
-</file>
-
 <file path=ppt/slides/slide2.xml><?xml version="1.0" encoding="utf-8"?>
 <p:sld xmlns:a="http://schemas.openxmlformats.org/drawingml/2006/main" xmlns:r="http://schemas.openxmlformats.org/officeDocument/2006/relationships" xmlns:p="http://schemas.openxmlformats.org/presentationml/2006/main">
   <p:cSld>
@@ -8530,11 +8380,7 @@
             </a:r>
             <a:r>
               <a:rPr lang="en-US" dirty="0" smtClean="0"/>
-              <a:t>arrays</a:t>
-            </a:r>
-            <a:r>
-              <a:rPr lang="en-US" dirty="0" smtClean="0"/>
-              <a:t>)</a:t>
+              <a:t>arrays)</a:t>
             </a:r>
             <a:endParaRPr lang="en-US" dirty="0"/>
           </a:p>
@@ -8577,11 +8423,7 @@
             <a:pPr algn="just"/>
             <a:r>
               <a:rPr lang="bg-BG" dirty="0" smtClean="0"/>
-              <a:t>Поредността на елемените е фиксирина, т.е. </a:t>
-            </a:r>
-            <a:r>
-              <a:rPr lang="bg-BG" dirty="0" smtClean="0"/>
-              <a:t>ясно е кой елемент къде се намира</a:t>
+              <a:t>Поредността на елемените е фиксирина, т.е. ясно е кой елемент къде се намира</a:t>
             </a:r>
           </a:p>
           <a:p>
@@ -8811,20 +8653,6 @@
               </a:rPr>
               <a:t>Масив от 5 елемента</a:t>
             </a:r>
-            <a:endParaRPr lang="bg-BG" sz="2800" b="1" dirty="0" smtClean="0">
-              <a:solidFill>
-                <a:srgbClr val="F7FFE7"/>
-              </a:solidFill>
-              <a:effectLst>
-                <a:outerShdw blurRad="38100" dist="38100" dir="2700000" algn="tl">
-                  <a:srgbClr val="000000">
-                    <a:alpha val="43137"/>
-                  </a:srgbClr>
-                </a:outerShdw>
-              </a:effectLst>
-              <a:latin typeface="+mn-lt"/>
-              <a:cs typeface="Consolas" pitchFamily="49" charset="0"/>
-            </a:endParaRPr>
           </a:p>
         </p:txBody>
       </p:sp>
@@ -8902,20 +8730,6 @@
               </a:rPr>
               <a:t>индекс</a:t>
             </a:r>
-            <a:endParaRPr lang="bg-BG" sz="2800" b="1" dirty="0" smtClean="0">
-              <a:solidFill>
-                <a:srgbClr val="F7FFE7"/>
-              </a:solidFill>
-              <a:effectLst>
-                <a:outerShdw blurRad="38100" dist="38100" dir="2700000" algn="tl">
-                  <a:srgbClr val="000000">
-                    <a:alpha val="43137"/>
-                  </a:srgbClr>
-                </a:outerShdw>
-              </a:effectLst>
-              <a:latin typeface="+mn-lt"/>
-              <a:cs typeface="Consolas" pitchFamily="49" charset="0"/>
-            </a:endParaRPr>
           </a:p>
         </p:txBody>
       </p:sp>
@@ -8993,20 +8807,6 @@
               </a:rPr>
               <a:t>елемент</a:t>
             </a:r>
-            <a:endParaRPr lang="bg-BG" sz="2800" b="1" dirty="0" smtClean="0">
-              <a:solidFill>
-                <a:srgbClr val="F7FFE7"/>
-              </a:solidFill>
-              <a:effectLst>
-                <a:outerShdw blurRad="38100" dist="38100" dir="2700000" algn="tl">
-                  <a:srgbClr val="000000">
-                    <a:alpha val="43137"/>
-                  </a:srgbClr>
-                </a:outerShdw>
-              </a:effectLst>
-              <a:latin typeface="+mn-lt"/>
-              <a:cs typeface="Consolas" pitchFamily="49" charset="0"/>
-            </a:endParaRPr>
           </a:p>
         </p:txBody>
       </p:sp>
@@ -9793,6 +9593,342 @@
 </p:sld>
 </file>
 
+<file path=ppt/slides/slide20.xml><?xml version="1.0" encoding="utf-8"?>
+<p:sld xmlns:a="http://schemas.openxmlformats.org/drawingml/2006/main" xmlns:r="http://schemas.openxmlformats.org/officeDocument/2006/relationships" xmlns:p="http://schemas.openxmlformats.org/presentationml/2006/main">
+  <p:cSld>
+    <p:spTree>
+      <p:nvGrpSpPr>
+        <p:cNvPr id="1" name=""/>
+        <p:cNvGrpSpPr/>
+        <p:nvPr/>
+      </p:nvGrpSpPr>
+      <p:grpSpPr>
+        <a:xfrm>
+          <a:off x="0" y="0"/>
+          <a:ext cx="0" cy="0"/>
+          <a:chOff x="0" y="0"/>
+          <a:chExt cx="0" cy="0"/>
+        </a:xfrm>
+      </p:grpSpPr>
+      <p:sp>
+        <p:nvSpPr>
+          <p:cNvPr id="2" name="Title 1"/>
+          <p:cNvSpPr>
+            <a:spLocks noGrp="1"/>
+          </p:cNvSpPr>
+          <p:nvPr>
+            <p:ph type="title"/>
+          </p:nvPr>
+        </p:nvSpPr>
+        <p:spPr/>
+        <p:txBody>
+          <a:bodyPr/>
+          <a:lstStyle/>
+          <a:p>
+            <a:r>
+              <a:rPr lang="bg-BG" dirty="0" smtClean="0"/>
+              <a:t>Домашна работа</a:t>
+            </a:r>
+            <a:endParaRPr lang="en-US" dirty="0"/>
+          </a:p>
+        </p:txBody>
+      </p:sp>
+      <p:sp>
+        <p:nvSpPr>
+          <p:cNvPr id="3" name="Content Placeholder 2"/>
+          <p:cNvSpPr>
+            <a:spLocks noGrp="1"/>
+          </p:cNvSpPr>
+          <p:nvPr>
+            <p:ph idx="1"/>
+          </p:nvPr>
+        </p:nvSpPr>
+        <p:spPr>
+          <a:xfrm>
+            <a:off x="1484310" y="2262909"/>
+            <a:ext cx="10199690" cy="3999347"/>
+          </a:xfrm>
+        </p:spPr>
+        <p:txBody>
+          <a:bodyPr anchor="ctr" anchorCtr="0">
+            <a:normAutofit fontScale="85000" lnSpcReduction="10000"/>
+          </a:bodyPr>
+          <a:lstStyle/>
+          <a:p>
+            <a:pPr marL="457200" indent="-457200">
+              <a:buFont typeface="+mj-lt"/>
+              <a:buAutoNum type="arabicPeriod"/>
+            </a:pPr>
+            <a:r>
+              <a:rPr lang="bg-BG" dirty="0" smtClean="0"/>
+              <a:t>Напишете </a:t>
+            </a:r>
+            <a:r>
+              <a:rPr lang="en-US" dirty="0" smtClean="0"/>
+              <a:t>JS</a:t>
+            </a:r>
+            <a:r>
+              <a:rPr lang="bg-BG" dirty="0"/>
+              <a:t> </a:t>
+            </a:r>
+            <a:r>
+              <a:rPr lang="bg-BG" dirty="0" smtClean="0"/>
+              <a:t>код, който създава масив от 20 числа и го инициализира като всяко число има стойност съответния индекс, умножен по 3</a:t>
+            </a:r>
+          </a:p>
+          <a:p>
+            <a:pPr marL="457200" indent="-457200">
+              <a:buFont typeface="+mj-lt"/>
+              <a:buAutoNum type="arabicPeriod"/>
+            </a:pPr>
+            <a:r>
+              <a:rPr lang="bg-BG" dirty="0" smtClean="0"/>
+              <a:t>Напишете </a:t>
+            </a:r>
+            <a:r>
+              <a:rPr lang="en-US" dirty="0" smtClean="0"/>
+              <a:t>JS</a:t>
+            </a:r>
+            <a:r>
+              <a:rPr lang="bg-BG" dirty="0"/>
+              <a:t> </a:t>
+            </a:r>
+            <a:r>
+              <a:rPr lang="bg-BG" dirty="0" smtClean="0"/>
+              <a:t>код, който по зададен масив да намира най-дългата поредица от еднакви числа. Напр</a:t>
+            </a:r>
+            <a:r>
+              <a:rPr lang="bg-BG" dirty="0"/>
+              <a:t>. 2, 1, 1, 2, 3, 3, </a:t>
+            </a:r>
+            <a:r>
+              <a:rPr lang="bg-BG" b="1" dirty="0"/>
+              <a:t>2, 2, 2</a:t>
+            </a:r>
+            <a:r>
+              <a:rPr lang="bg-BG" dirty="0"/>
+              <a:t>, </a:t>
+            </a:r>
+            <a:r>
+              <a:rPr lang="bg-BG" dirty="0" smtClean="0"/>
+              <a:t>1  -&gt; 2</a:t>
+            </a:r>
+            <a:r>
+              <a:rPr lang="bg-BG" dirty="0"/>
+              <a:t>, 2, </a:t>
+            </a:r>
+            <a:r>
+              <a:rPr lang="bg-BG" dirty="0" smtClean="0"/>
+              <a:t>2</a:t>
+            </a:r>
+          </a:p>
+          <a:p>
+            <a:pPr marL="457200" indent="-457200">
+              <a:buFont typeface="+mj-lt"/>
+              <a:buAutoNum type="arabicPeriod"/>
+            </a:pPr>
+            <a:r>
+              <a:rPr lang="bg-BG" dirty="0" smtClean="0"/>
+              <a:t>Напишете </a:t>
+            </a:r>
+            <a:r>
+              <a:rPr lang="en-US" dirty="0" smtClean="0"/>
+              <a:t>JS</a:t>
+            </a:r>
+            <a:r>
+              <a:rPr lang="bg-BG" dirty="0" smtClean="0"/>
+              <a:t> код, който намира кое е най-често срещаното число в даден масив. </a:t>
+            </a:r>
+            <a:r>
+              <a:rPr lang="bg-BG" dirty="0"/>
+              <a:t>Напр. 4, 1, 1, </a:t>
+            </a:r>
+            <a:r>
+              <a:rPr lang="bg-BG" b="1" dirty="0"/>
+              <a:t>4</a:t>
+            </a:r>
+            <a:r>
+              <a:rPr lang="bg-BG" dirty="0"/>
+              <a:t>, 2, 3, </a:t>
+            </a:r>
+            <a:r>
+              <a:rPr lang="bg-BG" b="1" dirty="0"/>
+              <a:t>4</a:t>
+            </a:r>
+            <a:r>
+              <a:rPr lang="bg-BG" dirty="0"/>
+              <a:t>, </a:t>
+            </a:r>
+            <a:r>
+              <a:rPr lang="bg-BG" b="1" dirty="0"/>
+              <a:t>4</a:t>
+            </a:r>
+            <a:r>
+              <a:rPr lang="bg-BG" dirty="0"/>
+              <a:t>, 1, 2, </a:t>
+            </a:r>
+            <a:r>
+              <a:rPr lang="bg-BG" b="1" dirty="0"/>
+              <a:t>4</a:t>
+            </a:r>
+            <a:r>
+              <a:rPr lang="bg-BG" dirty="0"/>
+              <a:t>, 9, </a:t>
+            </a:r>
+            <a:r>
+              <a:rPr lang="bg-BG" dirty="0" smtClean="0"/>
+              <a:t>3 -&gt; </a:t>
+            </a:r>
+            <a:r>
+              <a:rPr lang="bg-BG" b="1" dirty="0" smtClean="0"/>
+              <a:t>4</a:t>
+            </a:r>
+            <a:endParaRPr lang="bg-BG" b="1" dirty="0"/>
+          </a:p>
+          <a:p>
+            <a:pPr marL="457200" indent="-457200">
+              <a:buFont typeface="+mj-lt"/>
+              <a:buAutoNum type="arabicPeriod"/>
+            </a:pPr>
+            <a:r>
+              <a:rPr lang="bg-BG" dirty="0" smtClean="0"/>
+              <a:t>Напишете </a:t>
+            </a:r>
+            <a:r>
+              <a:rPr lang="en-US" dirty="0" smtClean="0"/>
+              <a:t>JS</a:t>
+            </a:r>
+            <a:r>
+              <a:rPr lang="bg-BG" dirty="0" smtClean="0"/>
+              <a:t> код, който да сортира даден масив. *Има и хитър начин на решение... Помислете и потърсете </a:t>
+            </a:r>
+            <a:r>
+              <a:rPr lang="bg-BG" dirty="0" smtClean="0">
+                <a:sym typeface="Wingdings" panose="05000000000000000000" pitchFamily="2" charset="2"/>
+              </a:rPr>
+              <a:t></a:t>
+            </a:r>
+          </a:p>
+          <a:p>
+            <a:pPr marL="457200" indent="-457200">
+              <a:buFont typeface="+mj-lt"/>
+              <a:buAutoNum type="arabicPeriod"/>
+            </a:pPr>
+            <a:r>
+              <a:rPr lang="bg-BG" dirty="0" smtClean="0">
+                <a:sym typeface="Wingdings" panose="05000000000000000000" pitchFamily="2" charset="2"/>
+              </a:rPr>
+              <a:t>Напишете </a:t>
+            </a:r>
+            <a:r>
+              <a:rPr lang="en-US" dirty="0" smtClean="0">
+                <a:sym typeface="Wingdings" panose="05000000000000000000" pitchFamily="2" charset="2"/>
+              </a:rPr>
+              <a:t>JS </a:t>
+            </a:r>
+            <a:r>
+              <a:rPr lang="bg-BG" dirty="0" smtClean="0">
+                <a:sym typeface="Wingdings" panose="05000000000000000000" pitchFamily="2" charset="2"/>
+              </a:rPr>
+              <a:t>код, който да сортира масив по „</a:t>
+            </a:r>
+            <a:r>
+              <a:rPr lang="bg-BG" dirty="0" smtClean="0">
+                <a:sym typeface="Wingdings" panose="05000000000000000000" pitchFamily="2" charset="2"/>
+                <a:hlinkClick r:id="rId2"/>
+              </a:rPr>
+              <a:t>метода на мехурчето</a:t>
+            </a:r>
+            <a:r>
+              <a:rPr lang="bg-BG" dirty="0" smtClean="0">
+                <a:sym typeface="Wingdings" panose="05000000000000000000" pitchFamily="2" charset="2"/>
+              </a:rPr>
+              <a:t>“</a:t>
+            </a:r>
+            <a:r>
+              <a:rPr lang="en-US" dirty="0" smtClean="0">
+                <a:sym typeface="Wingdings" panose="05000000000000000000" pitchFamily="2" charset="2"/>
+              </a:rPr>
+              <a:t> (bubble sort)</a:t>
+            </a:r>
+            <a:r>
+              <a:rPr lang="bg-BG" dirty="0" smtClean="0">
+                <a:sym typeface="Wingdings" panose="05000000000000000000" pitchFamily="2" charset="2"/>
+              </a:rPr>
+              <a:t>.</a:t>
+            </a:r>
+          </a:p>
+          <a:p>
+            <a:pPr marL="457200" indent="-457200">
+              <a:buFont typeface="+mj-lt"/>
+              <a:buAutoNum type="arabicPeriod"/>
+            </a:pPr>
+            <a:r>
+              <a:rPr lang="bg-BG" dirty="0" smtClean="0">
+                <a:sym typeface="Wingdings" panose="05000000000000000000" pitchFamily="2" charset="2"/>
+              </a:rPr>
+              <a:t>Напишете </a:t>
+            </a:r>
+            <a:r>
+              <a:rPr lang="en-US" dirty="0" smtClean="0">
+                <a:sym typeface="Wingdings" panose="05000000000000000000" pitchFamily="2" charset="2"/>
+              </a:rPr>
+              <a:t>JS</a:t>
+            </a:r>
+            <a:r>
+              <a:rPr lang="bg-BG" dirty="0" smtClean="0">
+                <a:sym typeface="Wingdings" panose="05000000000000000000" pitchFamily="2" charset="2"/>
+              </a:rPr>
+              <a:t> код</a:t>
+            </a:r>
+            <a:r>
+              <a:rPr lang="en-US" dirty="0" smtClean="0">
+                <a:sym typeface="Wingdings" panose="05000000000000000000" pitchFamily="2" charset="2"/>
+              </a:rPr>
+              <a:t>, </a:t>
+            </a:r>
+            <a:r>
+              <a:rPr lang="bg-BG" dirty="0" smtClean="0">
+                <a:sym typeface="Wingdings" panose="05000000000000000000" pitchFamily="2" charset="2"/>
+              </a:rPr>
+              <a:t>който намира индекса на даден елемент в сортиран масив като се използва </a:t>
+            </a:r>
+            <a:r>
+              <a:rPr lang="bg-BG" dirty="0" smtClean="0">
+                <a:sym typeface="Wingdings" panose="05000000000000000000" pitchFamily="2" charset="2"/>
+                <a:hlinkClick r:id="rId3"/>
+              </a:rPr>
+              <a:t>двоично търсене </a:t>
+            </a:r>
+            <a:r>
+              <a:rPr lang="bg-BG" dirty="0" smtClean="0">
+                <a:sym typeface="Wingdings" panose="05000000000000000000" pitchFamily="2" charset="2"/>
+              </a:rPr>
+              <a:t>(</a:t>
+            </a:r>
+            <a:r>
+              <a:rPr lang="en-US" dirty="0" smtClean="0">
+                <a:sym typeface="Wingdings" panose="05000000000000000000" pitchFamily="2" charset="2"/>
+              </a:rPr>
+              <a:t>binary search)</a:t>
+            </a:r>
+            <a:endParaRPr lang="bg-BG" dirty="0" smtClean="0"/>
+          </a:p>
+        </p:txBody>
+      </p:sp>
+    </p:spTree>
+    <p:extLst>
+      <p:ext uri="{BB962C8B-B14F-4D97-AF65-F5344CB8AC3E}">
+        <p14:creationId xmlns:p14="http://schemas.microsoft.com/office/powerpoint/2010/main" val="2161688977"/>
+      </p:ext>
+    </p:extLst>
+  </p:cSld>
+  <p:clrMapOvr>
+    <a:masterClrMapping/>
+  </p:clrMapOvr>
+</p:sld>
+</file>
+
 <file path=ppt/slides/slide3.xml><?xml version="1.0" encoding="utf-8"?>
 <p:sld xmlns:a="http://schemas.openxmlformats.org/drawingml/2006/main" xmlns:r="http://schemas.openxmlformats.org/officeDocument/2006/relationships" xmlns:p="http://schemas.openxmlformats.org/presentationml/2006/main">
   <p:cSld>

</xml_diff>